<commit_message>
methodology added, gitignore updated
</commit_message>
<xml_diff>
--- a/Presentation/Midterm Presentation.pptx
+++ b/Presentation/Midterm Presentation.pptx
@@ -160,6 +160,30 @@
       </pc:sldChg>
     </pc:docChg>
   </pc:docChgLst>
+  <pc:docChgLst>
+    <pc:chgData name="Thomas Buchegger" userId="e9d10f62-fa07-4fc1-9248-edcb138c70e1" providerId="ADAL" clId="{E9D31AD9-BAB2-4385-AC4A-B20BBC9B1C1E}"/>
+    <pc:docChg chg="undo modSld">
+      <pc:chgData name="Thomas Buchegger" userId="e9d10f62-fa07-4fc1-9248-edcb138c70e1" providerId="ADAL" clId="{E9D31AD9-BAB2-4385-AC4A-B20BBC9B1C1E}" dt="2020-11-22T15:53:33.455" v="1" actId="732"/>
+      <pc:docMkLst>
+        <pc:docMk/>
+      </pc:docMkLst>
+      <pc:sldChg chg="modSp">
+        <pc:chgData name="Thomas Buchegger" userId="e9d10f62-fa07-4fc1-9248-edcb138c70e1" providerId="ADAL" clId="{E9D31AD9-BAB2-4385-AC4A-B20BBC9B1C1E}" dt="2020-11-22T15:53:33.455" v="1" actId="732"/>
+        <pc:sldMkLst>
+          <pc:docMk/>
+          <pc:sldMk cId="3711386085" sldId="317"/>
+        </pc:sldMkLst>
+        <pc:picChg chg="mod modCrop">
+          <ac:chgData name="Thomas Buchegger" userId="e9d10f62-fa07-4fc1-9248-edcb138c70e1" providerId="ADAL" clId="{E9D31AD9-BAB2-4385-AC4A-B20BBC9B1C1E}" dt="2020-11-22T15:53:33.455" v="1" actId="732"/>
+          <ac:picMkLst>
+            <pc:docMk/>
+            <pc:sldMk cId="3711386085" sldId="317"/>
+            <ac:picMk id="5" creationId="{D3AF0D81-999E-4DAC-9965-522243208EFD}"/>
+          </ac:picMkLst>
+        </pc:picChg>
+      </pc:sldChg>
+    </pc:docChg>
+  </pc:docChgLst>
 </pc:chgInfo>
 </file>
 
@@ -686,7 +710,7 @@
                 <a:cs typeface="+mn-cs"/>
               </a:defRPr>
             </a:pPr>
-            <a:endParaRPr lang="de-DE"/>
+            <a:endParaRPr lang="en-US"/>
           </a:p>
         </c:txPr>
         <c:crossAx val="454307336"/>
@@ -768,7 +792,7 @@
                   <a:cs typeface="+mn-cs"/>
                 </a:defRPr>
               </a:pPr>
-              <a:endParaRPr lang="de-DE"/>
+              <a:endParaRPr lang="en-US"/>
             </a:p>
           </c:txPr>
         </c:title>
@@ -800,7 +824,7 @@
                 <a:cs typeface="+mn-cs"/>
               </a:defRPr>
             </a:pPr>
-            <a:endParaRPr lang="de-DE"/>
+            <a:endParaRPr lang="en-US"/>
           </a:p>
         </c:txPr>
         <c:crossAx val="454309632"/>
@@ -842,7 +866,7 @@
               <a:cs typeface="+mn-cs"/>
             </a:defRPr>
           </a:pPr>
-          <a:endParaRPr lang="de-DE"/>
+          <a:endParaRPr lang="en-US"/>
         </a:p>
       </c:txPr>
     </c:legend>
@@ -871,7 +895,7 @@
       <a:pPr>
         <a:defRPr/>
       </a:pPr>
-      <a:endParaRPr lang="de-DE"/>
+      <a:endParaRPr lang="en-US"/>
     </a:p>
   </c:txPr>
   <c:externalData r:id="rId3">
@@ -1551,7 +1575,7 @@
                 <a:cs typeface="+mn-cs"/>
               </a:defRPr>
             </a:pPr>
-            <a:endParaRPr lang="de-DE"/>
+            <a:endParaRPr lang="en-US"/>
           </a:p>
         </c:txPr>
         <c:crossAx val="454307336"/>
@@ -1643,7 +1667,7 @@
                   <a:cs typeface="+mn-cs"/>
                 </a:defRPr>
               </a:pPr>
-              <a:endParaRPr lang="de-DE"/>
+              <a:endParaRPr lang="en-US"/>
             </a:p>
           </c:txPr>
         </c:title>
@@ -1672,7 +1696,7 @@
                 <a:cs typeface="+mn-cs"/>
               </a:defRPr>
             </a:pPr>
-            <a:endParaRPr lang="de-DE"/>
+            <a:endParaRPr lang="en-US"/>
           </a:p>
         </c:txPr>
         <c:crossAx val="454309632"/>
@@ -1714,7 +1738,7 @@
               <a:cs typeface="+mn-cs"/>
             </a:defRPr>
           </a:pPr>
-          <a:endParaRPr lang="de-DE"/>
+          <a:endParaRPr lang="en-US"/>
         </a:p>
       </c:txPr>
     </c:legend>
@@ -1750,7 +1774,7 @@
           <a:cs typeface="+mn-cs"/>
         </a:defRPr>
       </a:pPr>
-      <a:endParaRPr lang="de-DE"/>
+      <a:endParaRPr lang="en-US"/>
     </a:p>
   </c:txPr>
   <c:externalData r:id="rId3">
@@ -2258,7 +2282,7 @@
                 <a:cs typeface="+mn-cs"/>
               </a:defRPr>
             </a:pPr>
-            <a:endParaRPr lang="de-DE"/>
+            <a:endParaRPr lang="en-US"/>
           </a:p>
         </c:txPr>
         <c:crossAx val="454307336"/>
@@ -2350,7 +2374,7 @@
                   <a:cs typeface="+mn-cs"/>
                 </a:defRPr>
               </a:pPr>
-              <a:endParaRPr lang="de-DE"/>
+              <a:endParaRPr lang="en-US"/>
             </a:p>
           </c:txPr>
         </c:title>
@@ -2382,7 +2406,7 @@
                 <a:cs typeface="+mn-cs"/>
               </a:defRPr>
             </a:pPr>
-            <a:endParaRPr lang="de-DE"/>
+            <a:endParaRPr lang="en-US"/>
           </a:p>
         </c:txPr>
         <c:crossAx val="454309632"/>
@@ -2424,7 +2448,7 @@
               <a:cs typeface="+mn-cs"/>
             </a:defRPr>
           </a:pPr>
-          <a:endParaRPr lang="de-DE"/>
+          <a:endParaRPr lang="en-US"/>
         </a:p>
       </c:txPr>
     </c:legend>
@@ -2453,7 +2477,7 @@
       <a:pPr>
         <a:defRPr/>
       </a:pPr>
-      <a:endParaRPr lang="de-DE"/>
+      <a:endParaRPr lang="en-US"/>
     </a:p>
   </c:txPr>
   <c:externalData r:id="rId3">
@@ -3133,7 +3157,7 @@
                 <a:cs typeface="+mn-cs"/>
               </a:defRPr>
             </a:pPr>
-            <a:endParaRPr lang="de-DE"/>
+            <a:endParaRPr lang="en-US"/>
           </a:p>
         </c:txPr>
         <c:crossAx val="454307336"/>
@@ -3225,7 +3249,7 @@
                   <a:cs typeface="+mn-cs"/>
                 </a:defRPr>
               </a:pPr>
-              <a:endParaRPr lang="de-DE"/>
+              <a:endParaRPr lang="en-US"/>
             </a:p>
           </c:txPr>
         </c:title>
@@ -3254,7 +3278,7 @@
                 <a:cs typeface="+mn-cs"/>
               </a:defRPr>
             </a:pPr>
-            <a:endParaRPr lang="de-DE"/>
+            <a:endParaRPr lang="en-US"/>
           </a:p>
         </c:txPr>
         <c:crossAx val="454309632"/>
@@ -3296,7 +3320,7 @@
               <a:cs typeface="+mn-cs"/>
             </a:defRPr>
           </a:pPr>
-          <a:endParaRPr lang="de-DE"/>
+          <a:endParaRPr lang="en-US"/>
         </a:p>
       </c:txPr>
     </c:legend>
@@ -3332,7 +3356,7 @@
           <a:cs typeface="+mn-cs"/>
         </a:defRPr>
       </a:pPr>
-      <a:endParaRPr lang="de-DE"/>
+      <a:endParaRPr lang="en-US"/>
     </a:p>
   </c:txPr>
   <c:externalData r:id="rId3">
@@ -5607,7 +5631,7 @@
           <a:p>
             <a:fld id="{A70AE70C-D509-4E4B-9352-79C3D11520D1}" type="datetimeFigureOut">
               <a:rPr lang="de-DE" smtClean="0"/>
-              <a:t>16.11.2020</a:t>
+              <a:t>22.11.2020</a:t>
             </a:fld>
             <a:endParaRPr lang="de-DE"/>
           </a:p>
@@ -5785,7 +5809,7 @@
           <a:p>
             <a:fld id="{B77602DA-7CEE-4298-AF4B-1C87D65BAB06}" type="datetimeFigureOut">
               <a:rPr lang="de-CH" smtClean="0"/>
-              <a:t>16.11.2020</a:t>
+              <a:t>22.11.2020</a:t>
             </a:fld>
             <a:endParaRPr lang="de-CH" dirty="0"/>
           </a:p>

</xml_diff>